<commit_message>
Added presentation for vectors
</commit_message>
<xml_diff>
--- a/CPP-Examples/STL/STL_Presentation.pptx
+++ b/CPP-Examples/STL/STL_Presentation.pptx
@@ -107,6 +107,11 @@
       </a:defRPr>
     </a:lvl9pPr>
   </p:defaultTextStyle>
+  <p:extLst>
+    <p:ext uri="{EFAFB233-063F-42B5-8137-9DF3F51BA10A}">
+      <p15:sldGuideLst xmlns:p15="http://schemas.microsoft.com/office/powerpoint/2012/main"/>
+    </p:ext>
+  </p:extLst>
 </p:presentation>
 </file>
 
@@ -257,7 +262,7 @@
           <a:p>
             <a:fld id="{E2B668D4-B287-43EC-B7EB-12E01689B4F9}" type="datetimeFigureOut">
               <a:rPr lang="en-US" smtClean="0"/>
-              <a:t>8/10/2022</a:t>
+              <a:t>11/10/2022</a:t>
             </a:fld>
             <a:endParaRPr lang="en-US"/>
           </a:p>
@@ -455,7 +460,7 @@
           <a:p>
             <a:fld id="{E2B668D4-B287-43EC-B7EB-12E01689B4F9}" type="datetimeFigureOut">
               <a:rPr lang="en-US" smtClean="0"/>
-              <a:t>8/10/2022</a:t>
+              <a:t>11/10/2022</a:t>
             </a:fld>
             <a:endParaRPr lang="en-US"/>
           </a:p>
@@ -663,7 +668,7 @@
           <a:p>
             <a:fld id="{E2B668D4-B287-43EC-B7EB-12E01689B4F9}" type="datetimeFigureOut">
               <a:rPr lang="en-US" smtClean="0"/>
-              <a:t>8/10/2022</a:t>
+              <a:t>11/10/2022</a:t>
             </a:fld>
             <a:endParaRPr lang="en-US"/>
           </a:p>
@@ -861,7 +866,7 @@
           <a:p>
             <a:fld id="{E2B668D4-B287-43EC-B7EB-12E01689B4F9}" type="datetimeFigureOut">
               <a:rPr lang="en-US" smtClean="0"/>
-              <a:t>8/10/2022</a:t>
+              <a:t>11/10/2022</a:t>
             </a:fld>
             <a:endParaRPr lang="en-US"/>
           </a:p>
@@ -1136,7 +1141,7 @@
           <a:p>
             <a:fld id="{E2B668D4-B287-43EC-B7EB-12E01689B4F9}" type="datetimeFigureOut">
               <a:rPr lang="en-US" smtClean="0"/>
-              <a:t>8/10/2022</a:t>
+              <a:t>11/10/2022</a:t>
             </a:fld>
             <a:endParaRPr lang="en-US"/>
           </a:p>
@@ -1401,7 +1406,7 @@
           <a:p>
             <a:fld id="{E2B668D4-B287-43EC-B7EB-12E01689B4F9}" type="datetimeFigureOut">
               <a:rPr lang="en-US" smtClean="0"/>
-              <a:t>8/10/2022</a:t>
+              <a:t>11/10/2022</a:t>
             </a:fld>
             <a:endParaRPr lang="en-US"/>
           </a:p>
@@ -1813,7 +1818,7 @@
           <a:p>
             <a:fld id="{E2B668D4-B287-43EC-B7EB-12E01689B4F9}" type="datetimeFigureOut">
               <a:rPr lang="en-US" smtClean="0"/>
-              <a:t>8/10/2022</a:t>
+              <a:t>11/10/2022</a:t>
             </a:fld>
             <a:endParaRPr lang="en-US"/>
           </a:p>
@@ -1954,7 +1959,7 @@
           <a:p>
             <a:fld id="{E2B668D4-B287-43EC-B7EB-12E01689B4F9}" type="datetimeFigureOut">
               <a:rPr lang="en-US" smtClean="0"/>
-              <a:t>8/10/2022</a:t>
+              <a:t>11/10/2022</a:t>
             </a:fld>
             <a:endParaRPr lang="en-US"/>
           </a:p>
@@ -2067,7 +2072,7 @@
           <a:p>
             <a:fld id="{E2B668D4-B287-43EC-B7EB-12E01689B4F9}" type="datetimeFigureOut">
               <a:rPr lang="en-US" smtClean="0"/>
-              <a:t>8/10/2022</a:t>
+              <a:t>11/10/2022</a:t>
             </a:fld>
             <a:endParaRPr lang="en-US"/>
           </a:p>
@@ -2378,7 +2383,7 @@
           <a:p>
             <a:fld id="{E2B668D4-B287-43EC-B7EB-12E01689B4F9}" type="datetimeFigureOut">
               <a:rPr lang="en-US" smtClean="0"/>
-              <a:t>8/10/2022</a:t>
+              <a:t>11/10/2022</a:t>
             </a:fld>
             <a:endParaRPr lang="en-US"/>
           </a:p>
@@ -2666,7 +2671,7 @@
           <a:p>
             <a:fld id="{E2B668D4-B287-43EC-B7EB-12E01689B4F9}" type="datetimeFigureOut">
               <a:rPr lang="en-US" smtClean="0"/>
-              <a:t>8/10/2022</a:t>
+              <a:t>11/10/2022</a:t>
             </a:fld>
             <a:endParaRPr lang="en-US"/>
           </a:p>
@@ -2907,7 +2912,7 @@
           <a:p>
             <a:fld id="{E2B668D4-B287-43EC-B7EB-12E01689B4F9}" type="datetimeFigureOut">
               <a:rPr lang="en-US" smtClean="0"/>
-              <a:t>8/10/2022</a:t>
+              <a:t>11/10/2022</a:t>
             </a:fld>
             <a:endParaRPr lang="en-US"/>
           </a:p>
@@ -3533,69 +3538,283 @@
           </a:p>
         </p:txBody>
       </p:sp>
-      <p:sp>
-        <p:nvSpPr>
-          <p:cNvPr id="3" name="Content Placeholder 2">
-            <a:extLst>
-              <a:ext uri="{FF2B5EF4-FFF2-40B4-BE49-F238E27FC236}">
-                <a16:creationId xmlns:a16="http://schemas.microsoft.com/office/drawing/2014/main" id="{6AABCCB0-7017-DF98-D434-B31366113BC7}"/>
-              </a:ext>
-            </a:extLst>
-          </p:cNvPr>
-          <p:cNvSpPr>
-            <a:spLocks noGrp="1"/>
-          </p:cNvSpPr>
-          <p:nvPr>
-            <p:ph idx="1"/>
-          </p:nvPr>
-        </p:nvSpPr>
-        <p:spPr/>
-        <p:txBody>
-          <a:bodyPr>
-            <a:normAutofit/>
-          </a:bodyPr>
-          <a:lstStyle/>
-          <a:p>
-            <a:r>
-              <a:rPr lang="en-US" dirty="0"/>
-              <a:t>Dynamic arrays with the ability to resize itself.</a:t>
-            </a:r>
-          </a:p>
-          <a:p>
-            <a:r>
-              <a:rPr lang="en-US" dirty="0"/>
-              <a:t>Interesting functions:</a:t>
-            </a:r>
-          </a:p>
-          <a:p>
-            <a:pPr lvl="1"/>
-            <a:r>
-              <a:rPr lang="en-US" dirty="0" err="1"/>
-              <a:t>max_size</a:t>
-            </a:r>
-            <a:r>
-              <a:rPr lang="en-US" dirty="0"/>
-              <a:t>: </a:t>
-            </a:r>
-            <a:r>
-              <a:rPr lang="en-US" b="0" i="0" dirty="0">
-                <a:effectLst/>
-              </a:rPr>
-              <a:t>Theoretical maximum number of items that could be put in a vector. </a:t>
-            </a:r>
-          </a:p>
-          <a:p>
-            <a:pPr lvl="1"/>
-            <a:endParaRPr lang="en-US" dirty="0"/>
-          </a:p>
-          <a:p>
-            <a:endParaRPr lang="en-US" dirty="0"/>
-          </a:p>
-          <a:p>
-            <a:endParaRPr lang="en-US" dirty="0"/>
-          </a:p>
-        </p:txBody>
-      </p:sp>
+      <mc:AlternateContent xmlns:mc="http://schemas.openxmlformats.org/markup-compatibility/2006">
+        <mc:Choice xmlns:a14="http://schemas.microsoft.com/office/drawing/2010/main" Requires="a14">
+          <p:sp>
+            <p:nvSpPr>
+              <p:cNvPr id="3" name="Content Placeholder 2">
+                <a:extLst>
+                  <a:ext uri="{FF2B5EF4-FFF2-40B4-BE49-F238E27FC236}">
+                    <a16:creationId xmlns:a16="http://schemas.microsoft.com/office/drawing/2014/main" id="{6AABCCB0-7017-DF98-D434-B31366113BC7}"/>
+                  </a:ext>
+                </a:extLst>
+              </p:cNvPr>
+              <p:cNvSpPr>
+                <a:spLocks noGrp="1"/>
+              </p:cNvSpPr>
+              <p:nvPr>
+                <p:ph idx="1"/>
+              </p:nvPr>
+            </p:nvSpPr>
+            <p:spPr/>
+            <p:txBody>
+              <a:bodyPr>
+                <a:normAutofit fontScale="92500"/>
+              </a:bodyPr>
+              <a:lstStyle/>
+              <a:p>
+                <a:r>
+                  <a:rPr lang="en-US" dirty="0"/>
+                  <a:t>Dynamic arrays with the ability to resize itself.</a:t>
+                </a:r>
+              </a:p>
+              <a:p>
+                <a:r>
+                  <a:rPr lang="en-US" dirty="0"/>
+                  <a:t>Interesting functions:</a:t>
+                </a:r>
+              </a:p>
+              <a:p>
+                <a:endParaRPr lang="en-US" dirty="0"/>
+              </a:p>
+              <a:p>
+                <a:pPr lvl="1"/>
+                <a:r>
+                  <a:rPr lang="en-US" dirty="0" err="1"/>
+                  <a:t>shrink_to_fit</a:t>
+                </a:r>
+                <a:r>
+                  <a:rPr lang="en-US" dirty="0"/>
+                  <a:t>: Requests reduction of unused capacity.</a:t>
+                </a:r>
+              </a:p>
+              <a:p>
+                <a:pPr lvl="2">
+                  <a:buFontTx/>
+                  <a:buChar char="-"/>
+                </a:pPr>
+                <a:r>
+                  <a:rPr lang="en-US" dirty="0"/>
+                  <a:t>Non binding request.</a:t>
+                </a:r>
+              </a:p>
+              <a:p>
+                <a:pPr lvl="2">
+                  <a:buFontTx/>
+                  <a:buChar char="-"/>
+                </a:pPr>
+                <a:r>
+                  <a:rPr lang="en-US" dirty="0"/>
+                  <a:t>O(N)</a:t>
+                </a:r>
+              </a:p>
+              <a:p>
+                <a:pPr marL="0" indent="0">
+                  <a:buNone/>
+                </a:pPr>
+                <a:endParaRPr lang="en-US" dirty="0"/>
+              </a:p>
+              <a:p>
+                <a:pPr lvl="1"/>
+                <a:r>
+                  <a:rPr lang="en-US" dirty="0" err="1"/>
+                  <a:t>max_size</a:t>
+                </a:r>
+                <a:r>
+                  <a:rPr lang="en-US" dirty="0"/>
+                  <a:t>: </a:t>
+                </a:r>
+                <a:r>
+                  <a:rPr lang="en-US" b="0" i="0" dirty="0">
+                    <a:effectLst/>
+                  </a:rPr>
+                  <a:t>Theoretical maximum number of items that could be put in a vector. </a:t>
+                </a:r>
+              </a:p>
+              <a:p>
+                <a:pPr lvl="2"/>
+                <a:r>
+                  <a:rPr lang="en-US" dirty="0"/>
+                  <a:t>E.g.:</a:t>
+                </a:r>
+              </a:p>
+              <a:p>
+                <a:pPr lvl="2">
+                  <a:buFontTx/>
+                  <a:buChar char="-"/>
+                </a:pPr>
+                <a:r>
+                  <a:rPr lang="en-US" dirty="0"/>
+                  <a:t>Let 32 bit system and char = 1 bit. </a:t>
+                </a:r>
+                <a:r>
+                  <a:rPr lang="en-US" dirty="0" err="1"/>
+                  <a:t>max_size</a:t>
+                </a:r>
+                <a:r>
+                  <a:rPr lang="en-US" dirty="0"/>
+                  <a:t> = </a:t>
+                </a:r>
+                <a14:m>
+                  <m:oMath xmlns:m="http://schemas.openxmlformats.org/officeDocument/2006/math">
+                    <m:sSup>
+                      <m:sSupPr>
+                        <m:ctrlPr>
+                          <a:rPr lang="en-US" i="1" smtClean="0">
+                            <a:latin typeface="Cambria Math" panose="02040503050406030204" pitchFamily="18" charset="0"/>
+                          </a:rPr>
+                        </m:ctrlPr>
+                      </m:sSupPr>
+                      <m:e>
+                        <m:r>
+                          <a:rPr lang="en-US" b="0" i="1" smtClean="0">
+                            <a:latin typeface="Cambria Math" panose="02040503050406030204" pitchFamily="18" charset="0"/>
+                          </a:rPr>
+                          <m:t>2</m:t>
+                        </m:r>
+                      </m:e>
+                      <m:sup>
+                        <m:r>
+                          <a:rPr lang="en-US" b="0" i="1" smtClean="0">
+                            <a:latin typeface="Cambria Math" panose="02040503050406030204" pitchFamily="18" charset="0"/>
+                          </a:rPr>
+                          <m:t>32</m:t>
+                        </m:r>
+                      </m:sup>
+                    </m:sSup>
+                  </m:oMath>
+                </a14:m>
+                <a:r>
+                  <a:rPr lang="en-US" dirty="0"/>
+                  <a:t> char values.</a:t>
+                </a:r>
+              </a:p>
+              <a:p>
+                <a:pPr lvl="2">
+                  <a:buFontTx/>
+                  <a:buChar char="-"/>
+                </a:pPr>
+                <a:r>
+                  <a:rPr lang="en-US" dirty="0"/>
+                  <a:t>Let 32 bit system and int = 4 bit. </a:t>
+                </a:r>
+                <a:r>
+                  <a:rPr lang="en-US" dirty="0" err="1"/>
+                  <a:t>max_size</a:t>
+                </a:r>
+                <a:r>
+                  <a:rPr lang="en-US" dirty="0"/>
+                  <a:t> = </a:t>
+                </a:r>
+                <a14:m>
+                  <m:oMath xmlns:m="http://schemas.openxmlformats.org/officeDocument/2006/math">
+                    <m:sSup>
+                      <m:sSupPr>
+                        <m:ctrlPr>
+                          <a:rPr lang="en-US" i="1" smtClean="0">
+                            <a:latin typeface="Cambria Math" panose="02040503050406030204" pitchFamily="18" charset="0"/>
+                          </a:rPr>
+                        </m:ctrlPr>
+                      </m:sSupPr>
+                      <m:e>
+                        <m:r>
+                          <a:rPr lang="en-US" b="0" i="1" smtClean="0">
+                            <a:latin typeface="Cambria Math" panose="02040503050406030204" pitchFamily="18" charset="0"/>
+                          </a:rPr>
+                          <m:t>2</m:t>
+                        </m:r>
+                      </m:e>
+                      <m:sup>
+                        <m:r>
+                          <a:rPr lang="en-US" b="0" i="1" smtClean="0">
+                            <a:latin typeface="Cambria Math" panose="02040503050406030204" pitchFamily="18" charset="0"/>
+                          </a:rPr>
+                          <m:t>3</m:t>
+                        </m:r>
+                        <m:r>
+                          <a:rPr lang="en-US" b="0" i="1" smtClean="0">
+                            <a:latin typeface="Cambria Math" panose="02040503050406030204" pitchFamily="18" charset="0"/>
+                          </a:rPr>
+                          <m:t>0</m:t>
+                        </m:r>
+                      </m:sup>
+                    </m:sSup>
+                  </m:oMath>
+                </a14:m>
+                <a:r>
+                  <a:rPr lang="en-US" dirty="0"/>
+                  <a:t> int values.</a:t>
+                </a:r>
+              </a:p>
+              <a:p>
+                <a:pPr lvl="2">
+                  <a:buFontTx/>
+                  <a:buChar char="-"/>
+                </a:pPr>
+                <a:endParaRPr lang="en-US" dirty="0"/>
+              </a:p>
+              <a:p>
+                <a:pPr lvl="2">
+                  <a:buFontTx/>
+                  <a:buChar char="-"/>
+                </a:pPr>
+                <a:endParaRPr lang="en-US" b="0" i="0" dirty="0">
+                  <a:effectLst/>
+                </a:endParaRPr>
+              </a:p>
+              <a:p>
+                <a:pPr lvl="1"/>
+                <a:endParaRPr lang="en-US" dirty="0"/>
+              </a:p>
+              <a:p>
+                <a:endParaRPr lang="en-US" dirty="0"/>
+              </a:p>
+              <a:p>
+                <a:endParaRPr lang="en-US" dirty="0"/>
+              </a:p>
+            </p:txBody>
+          </p:sp>
+        </mc:Choice>
+        <mc:Fallback>
+          <p:sp>
+            <p:nvSpPr>
+              <p:cNvPr id="3" name="Content Placeholder 2">
+                <a:extLst>
+                  <a:ext uri="{FF2B5EF4-FFF2-40B4-BE49-F238E27FC236}">
+                    <a16:creationId xmlns:a16="http://schemas.microsoft.com/office/drawing/2014/main" id="{6AABCCB0-7017-DF98-D434-B31366113BC7}"/>
+                  </a:ext>
+                </a:extLst>
+              </p:cNvPr>
+              <p:cNvSpPr>
+                <a:spLocks noGrp="1" noRot="1" noChangeAspect="1" noMove="1" noResize="1" noEditPoints="1" noAdjustHandles="1" noChangeArrowheads="1" noChangeShapeType="1" noTextEdit="1"/>
+              </p:cNvSpPr>
+              <p:nvPr>
+                <p:ph idx="1"/>
+              </p:nvPr>
+            </p:nvSpPr>
+            <p:spPr>
+              <a:blipFill>
+                <a:blip r:embed="rId2"/>
+                <a:stretch>
+                  <a:fillRect l="-928" t="-2101" b="-280"/>
+                </a:stretch>
+              </a:blipFill>
+            </p:spPr>
+            <p:txBody>
+              <a:bodyPr/>
+              <a:lstStyle/>
+              <a:p>
+                <a:r>
+                  <a:rPr lang="en-US">
+                    <a:noFill/>
+                  </a:rPr>
+                  <a:t> </a:t>
+                </a:r>
+              </a:p>
+            </p:txBody>
+          </p:sp>
+        </mc:Fallback>
+      </mc:AlternateContent>
     </p:spTree>
     <p:extLst>
       <p:ext uri="{BB962C8B-B14F-4D97-AF65-F5344CB8AC3E}">
@@ -3784,6 +4003,220 @@
               </a:rPr>
               <a:t>https://www.geeksforgeeks.org/vector-in-cpp-stl/</a:t>
             </a:r>
+            <a:endParaRPr kumimoji="0" lang="en-US" sz="900" b="0" i="0" u="none" strike="noStrike" kern="1200" cap="none" spc="0" normalizeH="0" baseline="0" noProof="0" dirty="0">
+              <a:ln>
+                <a:noFill/>
+              </a:ln>
+              <a:solidFill>
+                <a:prstClr val="black"/>
+              </a:solidFill>
+              <a:effectLst/>
+              <a:uLnTx/>
+              <a:uFillTx/>
+              <a:latin typeface="Calibri" panose="020F0502020204030204"/>
+              <a:ea typeface="+mn-ea"/>
+              <a:cs typeface="+mn-cs"/>
+            </a:endParaRPr>
+          </a:p>
+          <a:p>
+            <a:pPr marL="0" indent="0">
+              <a:buNone/>
+              <a:defRPr/>
+            </a:pPr>
+            <a:r>
+              <a:rPr kumimoji="0" lang="en-US" sz="900" b="0" i="0" u="none" strike="noStrike" kern="1200" cap="none" spc="0" normalizeH="0" baseline="0" noProof="0" dirty="0">
+                <a:ln>
+                  <a:noFill/>
+                </a:ln>
+                <a:solidFill>
+                  <a:prstClr val="black"/>
+                </a:solidFill>
+                <a:effectLst/>
+                <a:uLnTx/>
+                <a:uFillTx/>
+                <a:latin typeface="Calibri" panose="020F0502020204030204"/>
+                <a:ea typeface="+mn-ea"/>
+                <a:cs typeface="+mn-cs"/>
+                <a:hlinkClick r:id="rId4"/>
+              </a:rPr>
+              <a:t>https://qr.ae/pGclP6</a:t>
+            </a:r>
+            <a:endParaRPr kumimoji="0" lang="en-US" sz="900" b="0" i="0" u="none" strike="noStrike" kern="1200" cap="none" spc="0" normalizeH="0" baseline="0" noProof="0" dirty="0">
+              <a:ln>
+                <a:noFill/>
+              </a:ln>
+              <a:solidFill>
+                <a:prstClr val="black"/>
+              </a:solidFill>
+              <a:effectLst/>
+              <a:uLnTx/>
+              <a:uFillTx/>
+              <a:latin typeface="Calibri" panose="020F0502020204030204"/>
+              <a:ea typeface="+mn-ea"/>
+              <a:cs typeface="+mn-cs"/>
+            </a:endParaRPr>
+          </a:p>
+          <a:p>
+            <a:pPr marL="0" indent="0">
+              <a:buNone/>
+              <a:defRPr/>
+            </a:pPr>
+            <a:r>
+              <a:rPr lang="en-US" sz="900" dirty="0">
+                <a:solidFill>
+                  <a:prstClr val="black"/>
+                </a:solidFill>
+                <a:latin typeface="Calibri" panose="020F0502020204030204"/>
+                <a:hlinkClick r:id="rId5"/>
+              </a:rPr>
+              <a:t>https://stackoverflow.com/a/3813203/4168707</a:t>
+            </a:r>
+            <a:endParaRPr lang="en-US" sz="900" dirty="0">
+              <a:solidFill>
+                <a:prstClr val="black"/>
+              </a:solidFill>
+              <a:latin typeface="Calibri" panose="020F0502020204030204"/>
+            </a:endParaRPr>
+          </a:p>
+          <a:p>
+            <a:pPr marL="0" indent="0">
+              <a:buNone/>
+              <a:defRPr/>
+            </a:pPr>
+            <a:r>
+              <a:rPr lang="en-US" sz="900" dirty="0">
+                <a:solidFill>
+                  <a:prstClr val="black"/>
+                </a:solidFill>
+                <a:latin typeface="Calibri" panose="020F0502020204030204"/>
+                <a:hlinkClick r:id="rId6"/>
+              </a:rPr>
+              <a:t>https://stackoverflow.com/a/2664094/4168707</a:t>
+            </a:r>
+            <a:endParaRPr lang="en-US" sz="900" dirty="0">
+              <a:solidFill>
+                <a:prstClr val="black"/>
+              </a:solidFill>
+              <a:latin typeface="Calibri" panose="020F0502020204030204"/>
+            </a:endParaRPr>
+          </a:p>
+          <a:p>
+            <a:pPr marL="0" indent="0">
+              <a:buNone/>
+              <a:defRPr/>
+            </a:pPr>
+            <a:r>
+              <a:rPr lang="en-US" sz="900" dirty="0">
+                <a:solidFill>
+                  <a:prstClr val="black"/>
+                </a:solidFill>
+                <a:latin typeface="Calibri" panose="020F0502020204030204"/>
+                <a:hlinkClick r:id="rId7"/>
+              </a:rPr>
+              <a:t>https://en.cppreference.com/w/cpp/container/vector/shrink_to_fit</a:t>
+            </a:r>
+            <a:endParaRPr lang="en-US" sz="900" dirty="0">
+              <a:solidFill>
+                <a:prstClr val="black"/>
+              </a:solidFill>
+              <a:latin typeface="Calibri" panose="020F0502020204030204"/>
+            </a:endParaRPr>
+          </a:p>
+          <a:p>
+            <a:pPr marL="0" indent="0">
+              <a:buNone/>
+              <a:defRPr/>
+            </a:pPr>
+            <a:r>
+              <a:rPr lang="en-US" sz="900" dirty="0">
+                <a:solidFill>
+                  <a:prstClr val="black"/>
+                </a:solidFill>
+                <a:latin typeface="Calibri" panose="020F0502020204030204"/>
+                <a:hlinkClick r:id="rId8"/>
+              </a:rPr>
+              <a:t>https://stackoverflow.com/q/16518533/4168707</a:t>
+            </a:r>
+            <a:endParaRPr lang="en-US" sz="900" dirty="0">
+              <a:solidFill>
+                <a:prstClr val="black"/>
+              </a:solidFill>
+              <a:latin typeface="Calibri" panose="020F0502020204030204"/>
+            </a:endParaRPr>
+          </a:p>
+          <a:p>
+            <a:pPr marL="0" indent="0">
+              <a:buNone/>
+              <a:defRPr/>
+            </a:pPr>
+            <a:r>
+              <a:rPr lang="en-US" sz="900" dirty="0">
+                <a:solidFill>
+                  <a:prstClr val="black"/>
+                </a:solidFill>
+                <a:latin typeface="Calibri" panose="020F0502020204030204"/>
+                <a:hlinkClick r:id="rId9"/>
+              </a:rPr>
+              <a:t>https://stackoverflow.com/a/68637039/4168707</a:t>
+            </a:r>
+            <a:endParaRPr lang="en-US" sz="900" dirty="0">
+              <a:solidFill>
+                <a:prstClr val="black"/>
+              </a:solidFill>
+              <a:latin typeface="Calibri" panose="020F0502020204030204"/>
+            </a:endParaRPr>
+          </a:p>
+          <a:p>
+            <a:pPr marL="0" indent="0">
+              <a:buNone/>
+              <a:defRPr/>
+            </a:pPr>
+            <a:r>
+              <a:rPr lang="en-US" sz="900" dirty="0">
+                <a:solidFill>
+                  <a:prstClr val="black"/>
+                </a:solidFill>
+                <a:latin typeface="Calibri" panose="020F0502020204030204"/>
+                <a:hlinkClick r:id="rId10"/>
+              </a:rPr>
+              <a:t>https://www.opensourceforu.com/2021/05/memory-management-in-lists-and-tuples/</a:t>
+            </a:r>
+            <a:endParaRPr lang="en-US" sz="900" dirty="0">
+              <a:solidFill>
+                <a:prstClr val="black"/>
+              </a:solidFill>
+              <a:latin typeface="Calibri" panose="020F0502020204030204"/>
+            </a:endParaRPr>
+          </a:p>
+          <a:p>
+            <a:pPr marL="0" indent="0">
+              <a:buNone/>
+              <a:defRPr/>
+            </a:pPr>
+            <a:endParaRPr lang="en-US" sz="900" dirty="0">
+              <a:solidFill>
+                <a:prstClr val="black"/>
+              </a:solidFill>
+              <a:latin typeface="Calibri" panose="020F0502020204030204"/>
+            </a:endParaRPr>
+          </a:p>
+          <a:p>
+            <a:pPr marL="0" indent="0">
+              <a:buNone/>
+              <a:defRPr/>
+            </a:pPr>
+            <a:endParaRPr lang="en-US" sz="900" dirty="0">
+              <a:solidFill>
+                <a:prstClr val="black"/>
+              </a:solidFill>
+              <a:latin typeface="Calibri" panose="020F0502020204030204"/>
+            </a:endParaRPr>
+          </a:p>
+          <a:p>
+            <a:pPr marL="0" indent="0">
+              <a:buNone/>
+              <a:defRPr/>
+            </a:pPr>
             <a:endParaRPr kumimoji="0" lang="en-US" sz="900" b="0" i="0" u="none" strike="noStrike" kern="1200" cap="none" spc="0" normalizeH="0" baseline="0" noProof="0" dirty="0">
               <a:ln>
                 <a:noFill/>

</xml_diff>

<commit_message>
Done presetnation for vector.
</commit_message>
<xml_diff>
--- a/CPP-Examples/STL/STL_Presentation.pptx
+++ b/CPP-Examples/STL/STL_Presentation.pptx
@@ -267,7 +267,7 @@
           <a:p>
             <a:fld id="{E2B668D4-B287-43EC-B7EB-12E01689B4F9}" type="datetimeFigureOut">
               <a:rPr lang="en-US" smtClean="0"/>
-              <a:t>20/10/2022</a:t>
+              <a:t>21-10-22</a:t>
             </a:fld>
             <a:endParaRPr lang="en-US"/>
           </a:p>
@@ -465,7 +465,7 @@
           <a:p>
             <a:fld id="{E2B668D4-B287-43EC-B7EB-12E01689B4F9}" type="datetimeFigureOut">
               <a:rPr lang="en-US" smtClean="0"/>
-              <a:t>20/10/2022</a:t>
+              <a:t>21-10-22</a:t>
             </a:fld>
             <a:endParaRPr lang="en-US"/>
           </a:p>
@@ -673,7 +673,7 @@
           <a:p>
             <a:fld id="{E2B668D4-B287-43EC-B7EB-12E01689B4F9}" type="datetimeFigureOut">
               <a:rPr lang="en-US" smtClean="0"/>
-              <a:t>20/10/2022</a:t>
+              <a:t>21-10-22</a:t>
             </a:fld>
             <a:endParaRPr lang="en-US"/>
           </a:p>
@@ -871,7 +871,7 @@
           <a:p>
             <a:fld id="{E2B668D4-B287-43EC-B7EB-12E01689B4F9}" type="datetimeFigureOut">
               <a:rPr lang="en-US" smtClean="0"/>
-              <a:t>20/10/2022</a:t>
+              <a:t>21-10-22</a:t>
             </a:fld>
             <a:endParaRPr lang="en-US"/>
           </a:p>
@@ -1146,7 +1146,7 @@
           <a:p>
             <a:fld id="{E2B668D4-B287-43EC-B7EB-12E01689B4F9}" type="datetimeFigureOut">
               <a:rPr lang="en-US" smtClean="0"/>
-              <a:t>20/10/2022</a:t>
+              <a:t>21-10-22</a:t>
             </a:fld>
             <a:endParaRPr lang="en-US"/>
           </a:p>
@@ -1411,7 +1411,7 @@
           <a:p>
             <a:fld id="{E2B668D4-B287-43EC-B7EB-12E01689B4F9}" type="datetimeFigureOut">
               <a:rPr lang="en-US" smtClean="0"/>
-              <a:t>20/10/2022</a:t>
+              <a:t>21-10-22</a:t>
             </a:fld>
             <a:endParaRPr lang="en-US"/>
           </a:p>
@@ -1823,7 +1823,7 @@
           <a:p>
             <a:fld id="{E2B668D4-B287-43EC-B7EB-12E01689B4F9}" type="datetimeFigureOut">
               <a:rPr lang="en-US" smtClean="0"/>
-              <a:t>20/10/2022</a:t>
+              <a:t>21-10-22</a:t>
             </a:fld>
             <a:endParaRPr lang="en-US"/>
           </a:p>
@@ -1964,7 +1964,7 @@
           <a:p>
             <a:fld id="{E2B668D4-B287-43EC-B7EB-12E01689B4F9}" type="datetimeFigureOut">
               <a:rPr lang="en-US" smtClean="0"/>
-              <a:t>20/10/2022</a:t>
+              <a:t>21-10-22</a:t>
             </a:fld>
             <a:endParaRPr lang="en-US"/>
           </a:p>
@@ -2077,7 +2077,7 @@
           <a:p>
             <a:fld id="{E2B668D4-B287-43EC-B7EB-12E01689B4F9}" type="datetimeFigureOut">
               <a:rPr lang="en-US" smtClean="0"/>
-              <a:t>20/10/2022</a:t>
+              <a:t>21-10-22</a:t>
             </a:fld>
             <a:endParaRPr lang="en-US"/>
           </a:p>
@@ -2388,7 +2388,7 @@
           <a:p>
             <a:fld id="{E2B668D4-B287-43EC-B7EB-12E01689B4F9}" type="datetimeFigureOut">
               <a:rPr lang="en-US" smtClean="0"/>
-              <a:t>20/10/2022</a:t>
+              <a:t>21-10-22</a:t>
             </a:fld>
             <a:endParaRPr lang="en-US"/>
           </a:p>
@@ -2676,7 +2676,7 @@
           <a:p>
             <a:fld id="{E2B668D4-B287-43EC-B7EB-12E01689B4F9}" type="datetimeFigureOut">
               <a:rPr lang="en-US" smtClean="0"/>
-              <a:t>20/10/2022</a:t>
+              <a:t>21-10-22</a:t>
             </a:fld>
             <a:endParaRPr lang="en-US"/>
           </a:p>
@@ -2917,7 +2917,7 @@
           <a:p>
             <a:fld id="{E2B668D4-B287-43EC-B7EB-12E01689B4F9}" type="datetimeFigureOut">
               <a:rPr lang="en-US" smtClean="0"/>
-              <a:t>20/10/2022</a:t>
+              <a:t>21-10-22</a:t>
             </a:fld>
             <a:endParaRPr lang="en-US"/>
           </a:p>
@@ -3355,7 +3355,10 @@
           <a:bodyPr/>
           <a:lstStyle/>
           <a:p>
-            <a:endParaRPr lang="en-US"/>
+            <a:r>
+              <a:rPr lang="en-US" dirty="0"/>
+              <a:t>C++ Presentation</a:t>
+            </a:r>
           </a:p>
         </p:txBody>
       </p:sp>
@@ -3437,7 +3440,7 @@
           <a:p>
             <a:r>
               <a:rPr lang="en-US" dirty="0"/>
-              <a:t>STL</a:t>
+              <a:t>Presentation 21/10/2022</a:t>
             </a:r>
           </a:p>
         </p:txBody>
@@ -3465,8 +3468,33 @@
           <a:p>
             <a:r>
               <a:rPr lang="en-US" dirty="0"/>
-              <a:t>Efficiently separates data structures and algorithms to operate on them.</a:t>
-            </a:r>
+              <a:t>vector</a:t>
+            </a:r>
+          </a:p>
+          <a:p>
+            <a:r>
+              <a:rPr lang="en-US" dirty="0"/>
+              <a:t>string</a:t>
+            </a:r>
+          </a:p>
+          <a:p>
+            <a:r>
+              <a:rPr lang="en-US" dirty="0" err="1"/>
+              <a:t>unordered_map</a:t>
+            </a:r>
+            <a:endParaRPr lang="en-US" dirty="0"/>
+          </a:p>
+          <a:p>
+            <a:r>
+              <a:rPr lang="en-US" dirty="0"/>
+              <a:t>optional</a:t>
+            </a:r>
+          </a:p>
+          <a:p>
+            <a:endParaRPr lang="en-US" dirty="0"/>
+          </a:p>
+          <a:p>
+            <a:endParaRPr lang="en-US" dirty="0"/>
           </a:p>
           <a:p>
             <a:endParaRPr lang="en-US" dirty="0"/>
@@ -3531,14 +3559,19 @@
             <p:ph type="title"/>
           </p:nvPr>
         </p:nvSpPr>
-        <p:spPr/>
+        <p:spPr>
+          <a:xfrm>
+            <a:off x="838200" y="325368"/>
+            <a:ext cx="10515600" cy="1325563"/>
+          </a:xfrm>
+        </p:spPr>
         <p:txBody>
           <a:bodyPr/>
           <a:lstStyle/>
           <a:p>
             <a:r>
               <a:rPr lang="en-US" dirty="0"/>
-              <a:t>vector</a:t>
+              <a:t>Std::vector</a:t>
             </a:r>
           </a:p>
         </p:txBody>
@@ -3579,7 +3612,13 @@
           <a:p>
             <a:r>
               <a:rPr lang="en-US" dirty="0"/>
-              <a:t>Iterators, Capacity, Element Access</a:t>
+              <a:t>Element access: Iterators and offset</a:t>
+            </a:r>
+          </a:p>
+          <a:p>
+            <a:r>
+              <a:rPr lang="en-US" dirty="0"/>
+              <a:t>Iterators, Capacity, Element Access, Modifiers</a:t>
             </a:r>
           </a:p>
           <a:p>
@@ -3627,7 +3666,7 @@
         </p:nvGrpSpPr>
         <p:grpSpPr>
           <a:xfrm>
-            <a:off x="7189365" y="2315361"/>
+            <a:off x="7199304" y="3229761"/>
             <a:ext cx="4572000" cy="2365696"/>
             <a:chOff x="7164198" y="2315361"/>
             <a:chExt cx="4572000" cy="2365696"/>
@@ -3799,13 +3838,13 @@
           <a:p>
             <a:r>
               <a:rPr lang="en-US" dirty="0"/>
-              <a:t>vector</a:t>
-            </a:r>
-          </a:p>
-        </p:txBody>
-      </p:sp>
-      <mc:AlternateContent xmlns:mc="http://schemas.openxmlformats.org/markup-compatibility/2006" xmlns:a14="http://schemas.microsoft.com/office/drawing/2010/main">
-        <mc:Choice Requires="a14">
+              <a:t>Std::vector</a:t>
+            </a:r>
+          </a:p>
+        </p:txBody>
+      </p:sp>
+      <mc:AlternateContent xmlns:mc="http://schemas.openxmlformats.org/markup-compatibility/2006">
+        <mc:Choice xmlns:a14="http://schemas.microsoft.com/office/drawing/2010/main" Requires="a14">
           <p:sp>
             <p:nvSpPr>
               <p:cNvPr id="3" name="Content Placeholder 2">
@@ -3830,7 +3869,7 @@
             </p:spPr>
             <p:txBody>
               <a:bodyPr>
-                <a:normAutofit/>
+                <a:normAutofit fontScale="92500" lnSpcReduction="10000"/>
               </a:bodyPr>
               <a:lstStyle/>
               <a:p>
@@ -3908,7 +3947,7 @@
                 </a:pPr>
                 <a:r>
                   <a:rPr lang="en-US" dirty="0"/>
-                  <a:t>Let 32 bit system and char = 1 bit. </a:t>
+                  <a:t>Let 32-bit system and char = 1 bit. </a:t>
                 </a:r>
                 <a:r>
                   <a:rPr lang="en-US" dirty="0" err="1"/>
@@ -3959,7 +3998,7 @@
                 </a:pPr>
                 <a:r>
                   <a:rPr lang="en-US" dirty="0"/>
-                  <a:t>Let 32 bit system and int = 4 bit. </a:t>
+                  <a:t>Let 32-bit system and int = 4 bit. </a:t>
                 </a:r>
                 <a:r>
                   <a:rPr lang="en-US" dirty="0" err="1"/>
@@ -4017,8 +4056,35 @@
                 </a:pPr>
                 <a:r>
                   <a:rPr lang="en-US" dirty="0"/>
-                  <a:t>emplace: ??</a:t>
+                  <a:t>emplace vs insert:</a:t>
                 </a:r>
+              </a:p>
+              <a:p>
+                <a:pPr lvl="2">
+                  <a:buFontTx/>
+                  <a:buChar char="-"/>
+                </a:pPr>
+                <a:r>
+                  <a:rPr lang="en-US" dirty="0"/>
+                  <a:t>Constructs objects vs copies object.</a:t>
+                </a:r>
+              </a:p>
+              <a:p>
+                <a:pPr lvl="2">
+                  <a:buFontTx/>
+                  <a:buChar char="-"/>
+                </a:pPr>
+                <a:r>
+                  <a:rPr lang="en-US" dirty="0"/>
+                  <a:t>Advantage ??</a:t>
+                </a:r>
+              </a:p>
+              <a:p>
+                <a:pPr lvl="2">
+                  <a:buFontTx/>
+                  <a:buChar char="-"/>
+                </a:pPr>
+                <a:endParaRPr lang="en-US" dirty="0"/>
               </a:p>
               <a:p>
                 <a:pPr lvl="2">
@@ -4049,7 +4115,7 @@
             </p:txBody>
           </p:sp>
         </mc:Choice>
-        <mc:Fallback xmlns="">
+        <mc:Fallback>
           <p:sp>
             <p:nvSpPr>
               <p:cNvPr id="3" name="Content Placeholder 2">
@@ -4074,7 +4140,7 @@
               <a:blipFill>
                 <a:blip r:embed="rId2"/>
                 <a:stretch>
-                  <a:fillRect l="-1043" t="-2241" b="-3221"/>
+                  <a:fillRect l="-870" t="-2801"/>
                 </a:stretch>
               </a:blipFill>
             </p:spPr>
@@ -4083,7 +4149,7 @@
               <a:lstStyle/>
               <a:p>
                 <a:r>
-                  <a:rPr lang="en-US">
+                  <a:rPr lang="en-GB">
                     <a:noFill/>
                   </a:rPr>
                   <a:t> </a:t>
@@ -4093,6 +4159,36 @@
           </p:sp>
         </mc:Fallback>
       </mc:AlternateContent>
+      <p:pic>
+        <p:nvPicPr>
+          <p:cNvPr id="5" name="Picture 4">
+            <a:extLst>
+              <a:ext uri="{FF2B5EF4-FFF2-40B4-BE49-F238E27FC236}">
+                <a16:creationId xmlns:a16="http://schemas.microsoft.com/office/drawing/2014/main" id="{F524142A-968D-2675-30F5-CCC286FB8486}"/>
+              </a:ext>
+            </a:extLst>
+          </p:cNvPr>
+          <p:cNvPicPr>
+            <a:picLocks noChangeAspect="1"/>
+          </p:cNvPicPr>
+          <p:nvPr/>
+        </p:nvPicPr>
+        <p:blipFill>
+          <a:blip r:embed="rId3"/>
+          <a:stretch>
+            <a:fillRect/>
+          </a:stretch>
+        </p:blipFill>
+        <p:spPr>
+          <a:xfrm>
+            <a:off x="5978554" y="4651399"/>
+            <a:ext cx="4887007" cy="1533739"/>
+          </a:xfrm>
+          <a:prstGeom prst="rect">
+            <a:avLst/>
+          </a:prstGeom>
+        </p:spPr>
+      </p:pic>
     </p:spTree>
     <p:extLst>
       <p:ext uri="{BB962C8B-B14F-4D97-AF65-F5344CB8AC3E}">

</xml_diff>